<commit_message>
Edit demo presentation with links
</commit_message>
<xml_diff>
--- a/doc/demo-2023-04-27/Tracing in kernel.pptx
+++ b/doc/demo-2023-04-27/Tracing in kernel.pptx
@@ -3756,14 +3756,36 @@
           <a:lstStyle/>
           <a:p>
             <a:r>
-              <a:rPr lang="en-US" dirty="0">
+              <a:rPr lang="en-SE" dirty="0">
                 <a:hlinkClick r:id="rId2"/>
               </a:rPr>
-              <a:t>https://github.com/sriramy/perf-scripts</a:t>
-            </a:r>
-            <a:endParaRPr lang="en-SE"/>
-          </a:p>
-          <a:p>
+              <a:t>This presentation</a:t>
+            </a:r>
+            <a:endParaRPr lang="en-SE" dirty="0"/>
+          </a:p>
+          <a:p>
+            <a:r>
+              <a:rPr lang="en-SE" dirty="0"/>
+              <a:t>Example perf scripts: </a:t>
+            </a:r>
+            <a:endParaRPr lang="en-SE" dirty="0">
+              <a:hlinkClick r:id="rId3"/>
+            </a:endParaRPr>
+          </a:p>
+          <a:p>
+            <a:pPr lvl="1"/>
+            <a:r>
+              <a:rPr lang="en-US" dirty="0">
+                <a:hlinkClick r:id="rId3"/>
+              </a:rPr>
+              <a:t>https://github.com/sriramy</a:t>
+            </a:r>
+            <a:r>
+              <a:rPr lang="en-US">
+                <a:hlinkClick r:id="rId3"/>
+              </a:rPr>
+              <a:t>/perf-scripts</a:t>
+            </a:r>
             <a:endParaRPr lang="en-SE" dirty="0"/>
           </a:p>
         </p:txBody>

</xml_diff>